<commit_message>
Added inbred lines box
</commit_message>
<xml_diff>
--- a/neveau_poster.pptx
+++ b/neveau_poster.pptx
@@ -16413,7 +16413,7 @@
         </p:nvSpPr>
         <p:spPr>
           <a:xfrm>
-            <a:off x="10725219" y="26499491"/>
+            <a:off x="10696934" y="26489069"/>
             <a:ext cx="17819029" cy="4270010"/>
           </a:xfrm>
           <a:prstGeom prst="rect">
@@ -16446,6 +16446,490 @@
           <a:p>
             <a:pPr algn="ctr"/>
             <a:endParaRPr lang="en-US" dirty="0"/>
+          </a:p>
+        </p:txBody>
+      </p:sp>
+      <p:pic>
+        <p:nvPicPr>
+          <p:cNvPr id="387" name="Picture 2">
+            <a:extLst>
+              <a:ext uri="{FF2B5EF4-FFF2-40B4-BE49-F238E27FC236}">
+                <a16:creationId xmlns:a16="http://schemas.microsoft.com/office/drawing/2014/main" id="{9496D576-1058-4685-BC92-8AFB3CF1BCE9}"/>
+              </a:ext>
+            </a:extLst>
+          </p:cNvPr>
+          <p:cNvPicPr>
+            <a:picLocks noChangeAspect="1" noChangeArrowheads="1"/>
+          </p:cNvPicPr>
+          <p:nvPr/>
+        </p:nvPicPr>
+        <p:blipFill rotWithShape="1">
+          <a:blip r:embed="rId10">
+            <a:extLst>
+              <a:ext uri="{28A0092B-C50C-407E-A947-70E740481C1C}">
+                <a14:useLocalDpi xmlns:a14="http://schemas.microsoft.com/office/drawing/2010/main" val="0"/>
+              </a:ext>
+            </a:extLst>
+          </a:blip>
+          <a:srcRect l="24217" t="5361" r="13465" b="10690"/>
+          <a:stretch/>
+        </p:blipFill>
+        <p:spPr bwMode="auto">
+          <a:xfrm>
+            <a:off x="12538374" y="26738987"/>
+            <a:ext cx="5414090" cy="3070537"/>
+          </a:xfrm>
+          <a:prstGeom prst="rect">
+            <a:avLst/>
+          </a:prstGeom>
+          <a:noFill/>
+          <a:ln>
+            <a:noFill/>
+          </a:ln>
+          <a:extLst>
+            <a:ext uri="{909E8E84-426E-40DD-AFC4-6F175D3DCCD1}">
+              <a14:hiddenFill xmlns:a14="http://schemas.microsoft.com/office/drawing/2010/main">
+                <a:solidFill>
+                  <a:schemeClr val="accent1"/>
+                </a:solidFill>
+              </a14:hiddenFill>
+            </a:ext>
+            <a:ext uri="{91240B29-F687-4F45-9708-019B960494DF}">
+              <a14:hiddenLine xmlns:a14="http://schemas.microsoft.com/office/drawing/2010/main" w="9525">
+                <a:solidFill>
+                  <a:schemeClr val="tx1"/>
+                </a:solidFill>
+                <a:miter lim="800000"/>
+                <a:headEnd/>
+                <a:tailEnd/>
+              </a14:hiddenLine>
+            </a:ext>
+          </a:extLst>
+        </p:spPr>
+      </p:pic>
+      <p:pic>
+        <p:nvPicPr>
+          <p:cNvPr id="388" name="Picture 2">
+            <a:extLst>
+              <a:ext uri="{FF2B5EF4-FFF2-40B4-BE49-F238E27FC236}">
+                <a16:creationId xmlns:a16="http://schemas.microsoft.com/office/drawing/2014/main" id="{DEEA6ADE-1C24-4A56-BB79-B97BA078D0BF}"/>
+              </a:ext>
+            </a:extLst>
+          </p:cNvPr>
+          <p:cNvPicPr>
+            <a:picLocks noChangeAspect="1" noChangeArrowheads="1"/>
+          </p:cNvPicPr>
+          <p:nvPr/>
+        </p:nvPicPr>
+        <p:blipFill rotWithShape="1">
+          <a:blip r:embed="rId11">
+            <a:extLst>
+              <a:ext uri="{28A0092B-C50C-407E-A947-70E740481C1C}">
+                <a14:useLocalDpi xmlns:a14="http://schemas.microsoft.com/office/drawing/2010/main" val="0"/>
+              </a:ext>
+            </a:extLst>
+          </a:blip>
+          <a:srcRect l="23927" t="5123" r="14301" b="14246"/>
+          <a:stretch/>
+        </p:blipFill>
+        <p:spPr bwMode="auto">
+          <a:xfrm>
+            <a:off x="20756403" y="26716044"/>
+            <a:ext cx="6329425" cy="3072384"/>
+          </a:xfrm>
+          <a:prstGeom prst="rect">
+            <a:avLst/>
+          </a:prstGeom>
+          <a:noFill/>
+          <a:ln>
+            <a:noFill/>
+          </a:ln>
+          <a:extLst>
+            <a:ext uri="{909E8E84-426E-40DD-AFC4-6F175D3DCCD1}">
+              <a14:hiddenFill xmlns:a14="http://schemas.microsoft.com/office/drawing/2010/main">
+                <a:solidFill>
+                  <a:schemeClr val="accent1"/>
+                </a:solidFill>
+              </a14:hiddenFill>
+            </a:ext>
+            <a:ext uri="{91240B29-F687-4F45-9708-019B960494DF}">
+              <a14:hiddenLine xmlns:a14="http://schemas.microsoft.com/office/drawing/2010/main" w="9525">
+                <a:solidFill>
+                  <a:schemeClr val="tx1"/>
+                </a:solidFill>
+                <a:miter lim="800000"/>
+                <a:headEnd/>
+                <a:tailEnd/>
+              </a14:hiddenLine>
+            </a:ext>
+          </a:extLst>
+        </p:spPr>
+      </p:pic>
+      <p:pic>
+        <p:nvPicPr>
+          <p:cNvPr id="389" name="Content Placeholder 4">
+            <a:extLst>
+              <a:ext uri="{FF2B5EF4-FFF2-40B4-BE49-F238E27FC236}">
+                <a16:creationId xmlns:a16="http://schemas.microsoft.com/office/drawing/2014/main" id="{DB15AD8A-7151-4648-B98F-56510C449BBB}"/>
+              </a:ext>
+            </a:extLst>
+          </p:cNvPr>
+          <p:cNvPicPr>
+            <a:picLocks noChangeAspect="1"/>
+          </p:cNvPicPr>
+          <p:nvPr/>
+        </p:nvPicPr>
+        <p:blipFill rotWithShape="1">
+          <a:blip r:embed="rId7">
+            <a:extLst>
+              <a:ext uri="{28A0092B-C50C-407E-A947-70E740481C1C}">
+                <a14:useLocalDpi xmlns:a14="http://schemas.microsoft.com/office/drawing/2010/main" val="0"/>
+              </a:ext>
+            </a:extLst>
+          </a:blip>
+          <a:srcRect l="71504" t="25240" r="2804" b="31451"/>
+          <a:stretch/>
+        </p:blipFill>
+        <p:spPr>
+          <a:xfrm>
+            <a:off x="17972144" y="27663180"/>
+            <a:ext cx="1138305" cy="1222149"/>
+          </a:xfrm>
+          <a:prstGeom prst="rect">
+            <a:avLst/>
+          </a:prstGeom>
+        </p:spPr>
+      </p:pic>
+      <p:pic>
+        <p:nvPicPr>
+          <p:cNvPr id="390" name="Content Placeholder 4">
+            <a:extLst>
+              <a:ext uri="{FF2B5EF4-FFF2-40B4-BE49-F238E27FC236}">
+                <a16:creationId xmlns:a16="http://schemas.microsoft.com/office/drawing/2014/main" id="{87A9242A-755A-463F-8167-4FCF4666DE9F}"/>
+              </a:ext>
+            </a:extLst>
+          </p:cNvPr>
+          <p:cNvPicPr>
+            <a:picLocks noChangeAspect="1"/>
+          </p:cNvPicPr>
+          <p:nvPr/>
+        </p:nvPicPr>
+        <p:blipFill rotWithShape="1">
+          <a:blip r:embed="rId7">
+            <a:extLst>
+              <a:ext uri="{28A0092B-C50C-407E-A947-70E740481C1C}">
+                <a14:useLocalDpi xmlns:a14="http://schemas.microsoft.com/office/drawing/2010/main" val="0"/>
+              </a:ext>
+            </a:extLst>
+          </a:blip>
+          <a:srcRect l="71504" t="25240" r="2804" b="31451"/>
+          <a:stretch/>
+        </p:blipFill>
+        <p:spPr>
+          <a:xfrm>
+            <a:off x="27163673" y="27663179"/>
+            <a:ext cx="1138305" cy="1222149"/>
+          </a:xfrm>
+          <a:prstGeom prst="rect">
+            <a:avLst/>
+          </a:prstGeom>
+        </p:spPr>
+      </p:pic>
+      <p:sp>
+        <p:nvSpPr>
+          <p:cNvPr id="392" name="TextBox 391">
+            <a:extLst>
+              <a:ext uri="{FF2B5EF4-FFF2-40B4-BE49-F238E27FC236}">
+                <a16:creationId xmlns:a16="http://schemas.microsoft.com/office/drawing/2014/main" id="{F9C45C75-6130-44AF-AD39-CB3BCC8A1C62}"/>
+              </a:ext>
+            </a:extLst>
+          </p:cNvPr>
+          <p:cNvSpPr txBox="1"/>
+          <p:nvPr/>
+        </p:nvSpPr>
+        <p:spPr>
+          <a:xfrm>
+            <a:off x="19018788" y="26821266"/>
+            <a:ext cx="2895600" cy="3385542"/>
+          </a:xfrm>
+          <a:prstGeom prst="rect">
+            <a:avLst/>
+          </a:prstGeom>
+          <a:noFill/>
+        </p:spPr>
+        <p:txBody>
+          <a:bodyPr wrap="square" rtlCol="0">
+            <a:spAutoFit/>
+          </a:bodyPr>
+          <a:lstStyle/>
+          <a:p>
+            <a:pPr>
+              <a:spcBef>
+                <a:spcPts val="1200"/>
+              </a:spcBef>
+            </a:pPr>
+            <a:r>
+              <a:rPr lang="en-US" dirty="0"/>
+              <a:t>Zm00001d045909</a:t>
+            </a:r>
+          </a:p>
+          <a:p>
+            <a:pPr>
+              <a:spcBef>
+                <a:spcPts val="1200"/>
+              </a:spcBef>
+            </a:pPr>
+            <a:r>
+              <a:rPr lang="en-US" dirty="0"/>
+              <a:t>Zm00001d036345_PSY1_T2</a:t>
+            </a:r>
+          </a:p>
+          <a:p>
+            <a:pPr>
+              <a:spcBef>
+                <a:spcPts val="1200"/>
+              </a:spcBef>
+            </a:pPr>
+            <a:r>
+              <a:rPr lang="en-US" dirty="0"/>
+              <a:t>ZM00001d036345_PSY1_T1</a:t>
+            </a:r>
+          </a:p>
+          <a:p>
+            <a:pPr>
+              <a:spcBef>
+                <a:spcPts val="1200"/>
+              </a:spcBef>
+            </a:pPr>
+            <a:r>
+              <a:rPr lang="en-US" dirty="0"/>
+              <a:t>Zm00001d033547</a:t>
+            </a:r>
+          </a:p>
+          <a:p>
+            <a:pPr>
+              <a:spcBef>
+                <a:spcPts val="1200"/>
+              </a:spcBef>
+            </a:pPr>
+            <a:r>
+              <a:rPr lang="en-US" dirty="0"/>
+              <a:t>Zm00001d026188</a:t>
+            </a:r>
+          </a:p>
+          <a:p>
+            <a:pPr>
+              <a:spcBef>
+                <a:spcPts val="1200"/>
+              </a:spcBef>
+            </a:pPr>
+            <a:r>
+              <a:rPr lang="en-US" dirty="0"/>
+              <a:t>Zm00001d025531</a:t>
+            </a:r>
+          </a:p>
+          <a:p>
+            <a:pPr>
+              <a:spcBef>
+                <a:spcPts val="1200"/>
+              </a:spcBef>
+            </a:pPr>
+            <a:r>
+              <a:rPr lang="en-US" dirty="0"/>
+              <a:t>Zm00001d012394_PSY2</a:t>
+            </a:r>
+          </a:p>
+          <a:p>
+            <a:pPr>
+              <a:spcBef>
+                <a:spcPts val="1200"/>
+              </a:spcBef>
+            </a:pPr>
+            <a:endParaRPr lang="en-US" dirty="0"/>
+          </a:p>
+        </p:txBody>
+      </p:sp>
+      <p:sp>
+        <p:nvSpPr>
+          <p:cNvPr id="393" name="TextBox 392">
+            <a:extLst>
+              <a:ext uri="{FF2B5EF4-FFF2-40B4-BE49-F238E27FC236}">
+                <a16:creationId xmlns:a16="http://schemas.microsoft.com/office/drawing/2014/main" id="{6848FF10-A7CF-4C43-85C2-E76E729DC458}"/>
+              </a:ext>
+            </a:extLst>
+          </p:cNvPr>
+          <p:cNvSpPr txBox="1"/>
+          <p:nvPr/>
+        </p:nvSpPr>
+        <p:spPr>
+          <a:xfrm>
+            <a:off x="10679795" y="26821266"/>
+            <a:ext cx="2895600" cy="3385542"/>
+          </a:xfrm>
+          <a:prstGeom prst="rect">
+            <a:avLst/>
+          </a:prstGeom>
+          <a:noFill/>
+        </p:spPr>
+        <p:txBody>
+          <a:bodyPr wrap="square" rtlCol="0">
+            <a:spAutoFit/>
+          </a:bodyPr>
+          <a:lstStyle/>
+          <a:p>
+            <a:pPr>
+              <a:spcBef>
+                <a:spcPts val="1200"/>
+              </a:spcBef>
+            </a:pPr>
+            <a:r>
+              <a:rPr lang="en-US" dirty="0"/>
+              <a:t>Zm00001d045909</a:t>
+            </a:r>
+          </a:p>
+          <a:p>
+            <a:pPr>
+              <a:spcBef>
+                <a:spcPts val="1200"/>
+              </a:spcBef>
+            </a:pPr>
+            <a:r>
+              <a:rPr lang="en-US" dirty="0"/>
+              <a:t>Zm00001d036345_PSY1_T2</a:t>
+            </a:r>
+          </a:p>
+          <a:p>
+            <a:pPr>
+              <a:spcBef>
+                <a:spcPts val="1200"/>
+              </a:spcBef>
+            </a:pPr>
+            <a:r>
+              <a:rPr lang="en-US" dirty="0"/>
+              <a:t>ZM00001d036345_PSY1_T1</a:t>
+            </a:r>
+          </a:p>
+          <a:p>
+            <a:pPr>
+              <a:spcBef>
+                <a:spcPts val="1200"/>
+              </a:spcBef>
+            </a:pPr>
+            <a:r>
+              <a:rPr lang="en-US" dirty="0"/>
+              <a:t>Zm00001d033547</a:t>
+            </a:r>
+          </a:p>
+          <a:p>
+            <a:pPr>
+              <a:spcBef>
+                <a:spcPts val="1200"/>
+              </a:spcBef>
+            </a:pPr>
+            <a:r>
+              <a:rPr lang="en-US" dirty="0"/>
+              <a:t>Zm00001d026188</a:t>
+            </a:r>
+          </a:p>
+          <a:p>
+            <a:pPr>
+              <a:spcBef>
+                <a:spcPts val="1200"/>
+              </a:spcBef>
+            </a:pPr>
+            <a:r>
+              <a:rPr lang="en-US" dirty="0"/>
+              <a:t>Zm00001d025531</a:t>
+            </a:r>
+          </a:p>
+          <a:p>
+            <a:pPr>
+              <a:spcBef>
+                <a:spcPts val="1200"/>
+              </a:spcBef>
+            </a:pPr>
+            <a:r>
+              <a:rPr lang="en-US" dirty="0"/>
+              <a:t>Zm00001d012394_PSY2</a:t>
+            </a:r>
+          </a:p>
+          <a:p>
+            <a:pPr>
+              <a:spcBef>
+                <a:spcPts val="1200"/>
+              </a:spcBef>
+            </a:pPr>
+            <a:endParaRPr lang="en-US" dirty="0"/>
+          </a:p>
+        </p:txBody>
+      </p:sp>
+      <p:sp>
+        <p:nvSpPr>
+          <p:cNvPr id="394" name="TextBox 393">
+            <a:extLst>
+              <a:ext uri="{FF2B5EF4-FFF2-40B4-BE49-F238E27FC236}">
+                <a16:creationId xmlns:a16="http://schemas.microsoft.com/office/drawing/2014/main" id="{00569DF6-330B-418C-BEB4-4D16D67E6813}"/>
+              </a:ext>
+            </a:extLst>
+          </p:cNvPr>
+          <p:cNvSpPr txBox="1"/>
+          <p:nvPr/>
+        </p:nvSpPr>
+        <p:spPr>
+          <a:xfrm>
+            <a:off x="12500975" y="29774954"/>
+            <a:ext cx="5451489" cy="307777"/>
+          </a:xfrm>
+          <a:prstGeom prst="rect">
+            <a:avLst/>
+          </a:prstGeom>
+          <a:noFill/>
+        </p:spPr>
+        <p:txBody>
+          <a:bodyPr wrap="square" rtlCol="0">
+            <a:spAutoFit/>
+          </a:bodyPr>
+          <a:lstStyle/>
+          <a:p>
+            <a:r>
+              <a:rPr lang="en-US" sz="1400" dirty="0"/>
+              <a:t>ND207  A679 CH70130 CML322 CML341 Florida32 IL14H   Ki21      NC206</a:t>
+            </a:r>
+          </a:p>
+        </p:txBody>
+      </p:sp>
+      <p:sp>
+        <p:nvSpPr>
+          <p:cNvPr id="395" name="TextBox 394">
+            <a:extLst>
+              <a:ext uri="{FF2B5EF4-FFF2-40B4-BE49-F238E27FC236}">
+                <a16:creationId xmlns:a16="http://schemas.microsoft.com/office/drawing/2014/main" id="{A34BEEB2-C81A-4811-A304-6C2B77297BCA}"/>
+              </a:ext>
+            </a:extLst>
+          </p:cNvPr>
+          <p:cNvSpPr txBox="1"/>
+          <p:nvPr/>
+        </p:nvSpPr>
+        <p:spPr>
+          <a:xfrm>
+            <a:off x="20750914" y="29774954"/>
+            <a:ext cx="6329425" cy="369332"/>
+          </a:xfrm>
+          <a:prstGeom prst="rect">
+            <a:avLst/>
+          </a:prstGeom>
+          <a:noFill/>
+        </p:spPr>
+        <p:txBody>
+          <a:bodyPr wrap="square" rtlCol="0">
+            <a:spAutoFit/>
+          </a:bodyPr>
+          <a:lstStyle/>
+          <a:p>
+            <a:r>
+              <a:rPr lang="en-US" dirty="0"/>
+              <a:t>   B68         B97   CML341 Florida32   K64     KY228       LH52        T8</a:t>
+            </a:r>
           </a:p>
         </p:txBody>
       </p:sp>

</xml_diff>